<commit_message>
adding programming and software files
</commit_message>
<xml_diff>
--- a/Project 1/Electrical Design/electricalDiagram.pptx
+++ b/Project 1/Electrical Design/electricalDiagram.pptx
@@ -243,7 +243,7 @@
           <a:p>
             <a:fld id="{5A852F11-8B9F-4E3A-84B2-D575512D38C3}" type="datetimeFigureOut">
               <a:rPr lang="en-US" smtClean="0"/>
-              <a:t>2/22/2016</a:t>
+              <a:t>2/23/2016</a:t>
             </a:fld>
             <a:endParaRPr lang="en-US"/>
           </a:p>
@@ -413,7 +413,7 @@
           <a:p>
             <a:fld id="{5A852F11-8B9F-4E3A-84B2-D575512D38C3}" type="datetimeFigureOut">
               <a:rPr lang="en-US" smtClean="0"/>
-              <a:t>2/22/2016</a:t>
+              <a:t>2/23/2016</a:t>
             </a:fld>
             <a:endParaRPr lang="en-US"/>
           </a:p>
@@ -593,7 +593,7 @@
           <a:p>
             <a:fld id="{5A852F11-8B9F-4E3A-84B2-D575512D38C3}" type="datetimeFigureOut">
               <a:rPr lang="en-US" smtClean="0"/>
-              <a:t>2/22/2016</a:t>
+              <a:t>2/23/2016</a:t>
             </a:fld>
             <a:endParaRPr lang="en-US"/>
           </a:p>
@@ -763,7 +763,7 @@
           <a:p>
             <a:fld id="{5A852F11-8B9F-4E3A-84B2-D575512D38C3}" type="datetimeFigureOut">
               <a:rPr lang="en-US" smtClean="0"/>
-              <a:t>2/22/2016</a:t>
+              <a:t>2/23/2016</a:t>
             </a:fld>
             <a:endParaRPr lang="en-US"/>
           </a:p>
@@ -1009,7 +1009,7 @@
           <a:p>
             <a:fld id="{5A852F11-8B9F-4E3A-84B2-D575512D38C3}" type="datetimeFigureOut">
               <a:rPr lang="en-US" smtClean="0"/>
-              <a:t>2/22/2016</a:t>
+              <a:t>2/23/2016</a:t>
             </a:fld>
             <a:endParaRPr lang="en-US"/>
           </a:p>
@@ -1241,7 +1241,7 @@
           <a:p>
             <a:fld id="{5A852F11-8B9F-4E3A-84B2-D575512D38C3}" type="datetimeFigureOut">
               <a:rPr lang="en-US" smtClean="0"/>
-              <a:t>2/22/2016</a:t>
+              <a:t>2/23/2016</a:t>
             </a:fld>
             <a:endParaRPr lang="en-US"/>
           </a:p>
@@ -1608,7 +1608,7 @@
           <a:p>
             <a:fld id="{5A852F11-8B9F-4E3A-84B2-D575512D38C3}" type="datetimeFigureOut">
               <a:rPr lang="en-US" smtClean="0"/>
-              <a:t>2/22/2016</a:t>
+              <a:t>2/23/2016</a:t>
             </a:fld>
             <a:endParaRPr lang="en-US"/>
           </a:p>
@@ -1726,7 +1726,7 @@
           <a:p>
             <a:fld id="{5A852F11-8B9F-4E3A-84B2-D575512D38C3}" type="datetimeFigureOut">
               <a:rPr lang="en-US" smtClean="0"/>
-              <a:t>2/22/2016</a:t>
+              <a:t>2/23/2016</a:t>
             </a:fld>
             <a:endParaRPr lang="en-US"/>
           </a:p>
@@ -1821,7 +1821,7 @@
           <a:p>
             <a:fld id="{5A852F11-8B9F-4E3A-84B2-D575512D38C3}" type="datetimeFigureOut">
               <a:rPr lang="en-US" smtClean="0"/>
-              <a:t>2/22/2016</a:t>
+              <a:t>2/23/2016</a:t>
             </a:fld>
             <a:endParaRPr lang="en-US"/>
           </a:p>
@@ -2098,7 +2098,7 @@
           <a:p>
             <a:fld id="{5A852F11-8B9F-4E3A-84B2-D575512D38C3}" type="datetimeFigureOut">
               <a:rPr lang="en-US" smtClean="0"/>
-              <a:t>2/22/2016</a:t>
+              <a:t>2/23/2016</a:t>
             </a:fld>
             <a:endParaRPr lang="en-US"/>
           </a:p>
@@ -2351,7 +2351,7 @@
           <a:p>
             <a:fld id="{5A852F11-8B9F-4E3A-84B2-D575512D38C3}" type="datetimeFigureOut">
               <a:rPr lang="en-US" smtClean="0"/>
-              <a:t>2/22/2016</a:t>
+              <a:t>2/23/2016</a:t>
             </a:fld>
             <a:endParaRPr lang="en-US"/>
           </a:p>
@@ -2564,7 +2564,7 @@
           <a:p>
             <a:fld id="{5A852F11-8B9F-4E3A-84B2-D575512D38C3}" type="datetimeFigureOut">
               <a:rPr lang="en-US" smtClean="0"/>
-              <a:t>2/22/2016</a:t>
+              <a:t>2/23/2016</a:t>
             </a:fld>
             <a:endParaRPr lang="en-US"/>
           </a:p>
@@ -4349,7 +4349,7 @@
         </p:nvCxnSpPr>
         <p:spPr>
           <a:xfrm rot="5400000">
-            <a:off x="3349612" y="2042631"/>
+            <a:off x="3360901" y="2042631"/>
             <a:ext cx="541867" cy="0"/>
           </a:xfrm>
           <a:prstGeom prst="line">
@@ -5572,7 +5572,7 @@
         </p:nvCxnSpPr>
         <p:spPr>
           <a:xfrm>
-            <a:off x="3359919" y="2316630"/>
+            <a:off x="3382497" y="2316630"/>
             <a:ext cx="127014" cy="0"/>
           </a:xfrm>
           <a:prstGeom prst="line">
@@ -5655,7 +5655,7 @@
         </p:nvSpPr>
         <p:spPr>
           <a:xfrm>
-            <a:off x="3508262" y="1880424"/>
+            <a:off x="3519551" y="1880424"/>
             <a:ext cx="214247" cy="164243"/>
           </a:xfrm>
           <a:prstGeom prst="ellipse">

</xml_diff>